<commit_message>
se mejoró el flyer
</commit_message>
<xml_diff>
--- a/imagenes/auxiliar.pptx
+++ b/imagenes/auxiliar.pptx
@@ -3300,8 +3300,8 @@
         </p:nvSpPr>
         <p:spPr>
           <a:xfrm>
-            <a:off x="12312" y="11155"/>
-            <a:ext cx="6821099" cy="1569660"/>
+            <a:off x="6387" y="11155"/>
+            <a:ext cx="7189789" cy="1569660"/>
           </a:xfrm>
           <a:prstGeom prst="rect">
             <a:avLst/>
@@ -3339,16 +3339,6 @@
           <a:p>
             <a:pPr algn="ctr"/>
             <a:r>
-              <a:rPr lang="es-CO" sz="4800" dirty="0" err="1" smtClean="0">
-                <a:solidFill>
-                  <a:schemeClr val="bg1"/>
-                </a:solidFill>
-                <a:latin typeface="Courier New" panose="02070309020205020404" pitchFamily="49" charset="0"/>
-                <a:cs typeface="Courier New" panose="02070309020205020404" pitchFamily="49" charset="0"/>
-              </a:rPr>
-              <a:t>Novembre</a:t>
-            </a:r>
-            <a:r>
               <a:rPr lang="es-CO" sz="4800" dirty="0" smtClean="0">
                 <a:solidFill>
                   <a:schemeClr val="bg1"/>
@@ -3356,7 +3346,17 @@
                 <a:latin typeface="Courier New" panose="02070309020205020404" pitchFamily="49" charset="0"/>
                 <a:cs typeface="Courier New" panose="02070309020205020404" pitchFamily="49" charset="0"/>
               </a:rPr>
-              <a:t> 8 de 2019</a:t>
+              <a:t>Noviembre </a:t>
+            </a:r>
+            <a:r>
+              <a:rPr lang="es-CO" sz="4800" dirty="0" smtClean="0">
+                <a:solidFill>
+                  <a:schemeClr val="bg1"/>
+                </a:solidFill>
+                <a:latin typeface="Courier New" panose="02070309020205020404" pitchFamily="49" charset="0"/>
+                <a:cs typeface="Courier New" panose="02070309020205020404" pitchFamily="49" charset="0"/>
+              </a:rPr>
+              <a:t>8 de 2019</a:t>
             </a:r>
             <a:endParaRPr lang="en-AU" sz="4800" dirty="0">
               <a:solidFill>
@@ -3376,7 +3376,7 @@
         </p:nvSpPr>
         <p:spPr>
           <a:xfrm>
-            <a:off x="7354703" y="506943"/>
+            <a:off x="7355241" y="440036"/>
             <a:ext cx="4688848" cy="523220"/>
           </a:xfrm>
           <a:prstGeom prst="rect">
@@ -3395,15 +3395,7 @@
                   <a:schemeClr val="bg1"/>
                 </a:solidFill>
               </a:rPr>
-              <a:t>https://</a:t>
-            </a:r>
-            <a:r>
-              <a:rPr lang="en-AU" sz="2800" dirty="0" smtClean="0">
-                <a:solidFill>
-                  <a:schemeClr val="bg1"/>
-                </a:solidFill>
-              </a:rPr>
-              <a:t>rdaymedellin.github.io</a:t>
+              <a:t>https://rdaymedellin.github.io</a:t>
             </a:r>
             <a:endParaRPr lang="en-AU" sz="2800" dirty="0">
               <a:solidFill>
@@ -3413,47 +3405,6 @@
           </a:p>
         </p:txBody>
       </p:sp>
-      <p:pic>
-        <p:nvPicPr>
-          <p:cNvPr id="7" name="Picture 8" descr="Tu cÃ³digo QR"/>
-          <p:cNvPicPr>
-            <a:picLocks noChangeAspect="1" noChangeArrowheads="1"/>
-          </p:cNvPicPr>
-          <p:nvPr/>
-        </p:nvPicPr>
-        <p:blipFill>
-          <a:blip r:embed="rId3">
-            <a:extLst>
-              <a:ext uri="{28A0092B-C50C-407E-A947-70E740481C1C}">
-                <a14:useLocalDpi xmlns:a14="http://schemas.microsoft.com/office/drawing/2010/main" val="0"/>
-              </a:ext>
-            </a:extLst>
-          </a:blip>
-          <a:srcRect/>
-          <a:stretch>
-            <a:fillRect/>
-          </a:stretch>
-        </p:blipFill>
-        <p:spPr bwMode="auto">
-          <a:xfrm>
-            <a:off x="9895490" y="3062101"/>
-            <a:ext cx="2296510" cy="2296510"/>
-          </a:xfrm>
-          <a:prstGeom prst="rect">
-            <a:avLst/>
-          </a:prstGeom>
-          <a:noFill/>
-          <a:extLst>
-            <a:ext uri="{909E8E84-426E-40DD-AFC4-6F175D3DCCD1}">
-              <a14:hiddenFill xmlns:a14="http://schemas.microsoft.com/office/drawing/2010/main">
-                <a:solidFill>
-                  <a:srgbClr val="FFFFFF"/>
-                </a:solidFill>
-              </a14:hiddenFill>
-            </a:ext>
-          </a:extLst>
-        </p:spPr>
-      </p:pic>
     </p:spTree>
     <p:extLst>
       <p:ext uri="{BB962C8B-B14F-4D97-AF65-F5344CB8AC3E}">

</xml_diff>

<commit_message>
se creó una ecard
</commit_message>
<xml_diff>
--- a/imagenes/auxiliar.pptx
+++ b/imagenes/auxiliar.pptx
@@ -262,7 +262,7 @@
           <a:p>
             <a:fld id="{29678B5A-351E-4098-8F04-5692B504D35C}" type="datetimeFigureOut">
               <a:rPr lang="en-AU" smtClean="0"/>
-              <a:t>4/02/2019</a:t>
+              <a:t>8/02/2019</a:t>
             </a:fld>
             <a:endParaRPr lang="en-AU"/>
           </a:p>
@@ -432,7 +432,7 @@
           <a:p>
             <a:fld id="{29678B5A-351E-4098-8F04-5692B504D35C}" type="datetimeFigureOut">
               <a:rPr lang="en-AU" smtClean="0"/>
-              <a:t>4/02/2019</a:t>
+              <a:t>8/02/2019</a:t>
             </a:fld>
             <a:endParaRPr lang="en-AU"/>
           </a:p>
@@ -612,7 +612,7 @@
           <a:p>
             <a:fld id="{29678B5A-351E-4098-8F04-5692B504D35C}" type="datetimeFigureOut">
               <a:rPr lang="en-AU" smtClean="0"/>
-              <a:t>4/02/2019</a:t>
+              <a:t>8/02/2019</a:t>
             </a:fld>
             <a:endParaRPr lang="en-AU"/>
           </a:p>
@@ -782,7 +782,7 @@
           <a:p>
             <a:fld id="{29678B5A-351E-4098-8F04-5692B504D35C}" type="datetimeFigureOut">
               <a:rPr lang="en-AU" smtClean="0"/>
-              <a:t>4/02/2019</a:t>
+              <a:t>8/02/2019</a:t>
             </a:fld>
             <a:endParaRPr lang="en-AU"/>
           </a:p>
@@ -1028,7 +1028,7 @@
           <a:p>
             <a:fld id="{29678B5A-351E-4098-8F04-5692B504D35C}" type="datetimeFigureOut">
               <a:rPr lang="en-AU" smtClean="0"/>
-              <a:t>4/02/2019</a:t>
+              <a:t>8/02/2019</a:t>
             </a:fld>
             <a:endParaRPr lang="en-AU"/>
           </a:p>
@@ -1260,7 +1260,7 @@
           <a:p>
             <a:fld id="{29678B5A-351E-4098-8F04-5692B504D35C}" type="datetimeFigureOut">
               <a:rPr lang="en-AU" smtClean="0"/>
-              <a:t>4/02/2019</a:t>
+              <a:t>8/02/2019</a:t>
             </a:fld>
             <a:endParaRPr lang="en-AU"/>
           </a:p>
@@ -1627,7 +1627,7 @@
           <a:p>
             <a:fld id="{29678B5A-351E-4098-8F04-5692B504D35C}" type="datetimeFigureOut">
               <a:rPr lang="en-AU" smtClean="0"/>
-              <a:t>4/02/2019</a:t>
+              <a:t>8/02/2019</a:t>
             </a:fld>
             <a:endParaRPr lang="en-AU"/>
           </a:p>
@@ -1745,7 +1745,7 @@
           <a:p>
             <a:fld id="{29678B5A-351E-4098-8F04-5692B504D35C}" type="datetimeFigureOut">
               <a:rPr lang="en-AU" smtClean="0"/>
-              <a:t>4/02/2019</a:t>
+              <a:t>8/02/2019</a:t>
             </a:fld>
             <a:endParaRPr lang="en-AU"/>
           </a:p>
@@ -1840,7 +1840,7 @@
           <a:p>
             <a:fld id="{29678B5A-351E-4098-8F04-5692B504D35C}" type="datetimeFigureOut">
               <a:rPr lang="en-AU" smtClean="0"/>
-              <a:t>4/02/2019</a:t>
+              <a:t>8/02/2019</a:t>
             </a:fld>
             <a:endParaRPr lang="en-AU"/>
           </a:p>
@@ -2117,7 +2117,7 @@
           <a:p>
             <a:fld id="{29678B5A-351E-4098-8F04-5692B504D35C}" type="datetimeFigureOut">
               <a:rPr lang="en-AU" smtClean="0"/>
-              <a:t>4/02/2019</a:t>
+              <a:t>8/02/2019</a:t>
             </a:fld>
             <a:endParaRPr lang="en-AU"/>
           </a:p>
@@ -2370,7 +2370,7 @@
           <a:p>
             <a:fld id="{29678B5A-351E-4098-8F04-5692B504D35C}" type="datetimeFigureOut">
               <a:rPr lang="en-AU" smtClean="0"/>
-              <a:t>4/02/2019</a:t>
+              <a:t>8/02/2019</a:t>
             </a:fld>
             <a:endParaRPr lang="en-AU"/>
           </a:p>
@@ -2586,7 +2586,7 @@
           <a:p>
             <a:fld id="{29678B5A-351E-4098-8F04-5692B504D35C}" type="datetimeFigureOut">
               <a:rPr lang="en-AU" smtClean="0"/>
-              <a:t>4/02/2019</a:t>
+              <a:t>8/02/2019</a:t>
             </a:fld>
             <a:endParaRPr lang="en-AU"/>
           </a:p>
@@ -3308,8 +3308,8 @@
         </p:nvSpPr>
         <p:spPr>
           <a:xfrm>
-            <a:off x="6387" y="11155"/>
-            <a:ext cx="7189789" cy="1569660"/>
+            <a:off x="6388" y="11155"/>
+            <a:ext cx="6807008" cy="1446550"/>
           </a:xfrm>
           <a:prstGeom prst="rect">
             <a:avLst/>
@@ -3317,14 +3317,14 @@
           <a:noFill/>
         </p:spPr>
         <p:txBody>
-          <a:bodyPr wrap="none" rtlCol="0">
+          <a:bodyPr wrap="square" rtlCol="0">
             <a:spAutoFit/>
           </a:bodyPr>
           <a:lstStyle/>
           <a:p>
             <a:pPr algn="ctr"/>
             <a:r>
-              <a:rPr lang="es-CO" sz="4800" dirty="0" err="1" smtClean="0">
+              <a:rPr lang="es-CO" sz="4400" dirty="0" err="1" smtClean="0">
                 <a:solidFill>
                   <a:schemeClr val="bg1"/>
                 </a:solidFill>
@@ -3334,7 +3334,7 @@
               <a:t>Rday</a:t>
             </a:r>
             <a:r>
-              <a:rPr lang="es-CO" sz="4800" dirty="0" smtClean="0">
+              <a:rPr lang="es-CO" sz="4400" dirty="0" smtClean="0">
                 <a:solidFill>
                   <a:schemeClr val="bg1"/>
                 </a:solidFill>
@@ -3347,7 +3347,7 @@
           <a:p>
             <a:pPr algn="ctr"/>
             <a:r>
-              <a:rPr lang="es-CO" sz="4800" dirty="0" smtClean="0">
+              <a:rPr lang="es-CO" sz="4400" dirty="0" smtClean="0">
                 <a:solidFill>
                   <a:schemeClr val="bg1"/>
                 </a:solidFill>
@@ -3356,7 +3356,7 @@
               </a:rPr>
               <a:t>Noviembre 8 de 2019</a:t>
             </a:r>
-            <a:endParaRPr lang="en-AU" sz="4800" dirty="0">
+            <a:endParaRPr lang="en-AU" sz="4400" dirty="0">
               <a:solidFill>
                 <a:schemeClr val="bg1"/>
               </a:solidFill>
@@ -3403,6 +3403,77 @@
           </a:p>
         </p:txBody>
       </p:sp>
+      <p:pic>
+        <p:nvPicPr>
+          <p:cNvPr id="7" name="Imagen 6"/>
+          <p:cNvPicPr>
+            <a:picLocks noChangeAspect="1"/>
+          </p:cNvPicPr>
+          <p:nvPr/>
+        </p:nvPicPr>
+        <p:blipFill>
+          <a:blip r:embed="rId3" cstate="print">
+            <a:extLst>
+              <a:ext uri="{28A0092B-C50C-407E-A947-70E740481C1C}">
+                <a14:useLocalDpi xmlns:a14="http://schemas.microsoft.com/office/drawing/2010/main" val="0"/>
+              </a:ext>
+            </a:extLst>
+          </a:blip>
+          <a:stretch>
+            <a:fillRect/>
+          </a:stretch>
+        </p:blipFill>
+        <p:spPr>
+          <a:xfrm>
+            <a:off x="1717289" y="5466912"/>
+            <a:ext cx="2709745" cy="1151715"/>
+          </a:xfrm>
+          <a:prstGeom prst="rect">
+            <a:avLst/>
+          </a:prstGeom>
+        </p:spPr>
+      </p:pic>
+      <p:pic>
+        <p:nvPicPr>
+          <p:cNvPr id="8" name="Picture 4" descr="Resultado de imagen para logo udea"/>
+          <p:cNvPicPr>
+            <a:picLocks noChangeAspect="1" noChangeArrowheads="1"/>
+          </p:cNvPicPr>
+          <p:nvPr/>
+        </p:nvPicPr>
+        <p:blipFill>
+          <a:blip r:embed="rId4">
+            <a:extLst>
+              <a:ext uri="{28A0092B-C50C-407E-A947-70E740481C1C}">
+                <a14:useLocalDpi xmlns:a14="http://schemas.microsoft.com/office/drawing/2010/main" val="0"/>
+              </a:ext>
+            </a:extLst>
+          </a:blip>
+          <a:srcRect/>
+          <a:stretch>
+            <a:fillRect/>
+          </a:stretch>
+        </p:blipFill>
+        <p:spPr bwMode="auto">
+          <a:xfrm>
+            <a:off x="6990327" y="5595130"/>
+            <a:ext cx="4093985" cy="1023497"/>
+          </a:xfrm>
+          <a:prstGeom prst="rect">
+            <a:avLst/>
+          </a:prstGeom>
+          <a:noFill/>
+          <a:extLst>
+            <a:ext uri="{909E8E84-426E-40DD-AFC4-6F175D3DCCD1}">
+              <a14:hiddenFill xmlns:a14="http://schemas.microsoft.com/office/drawing/2010/main">
+                <a:solidFill>
+                  <a:srgbClr val="FFFFFF"/>
+                </a:solidFill>
+              </a14:hiddenFill>
+            </a:ext>
+          </a:extLst>
+        </p:spPr>
+      </p:pic>
     </p:spTree>
     <p:extLst>
       <p:ext uri="{BB962C8B-B14F-4D97-AF65-F5344CB8AC3E}">
@@ -3952,13 +4023,6 @@
               </a:rPr>
               <a:t>://rdaymedellin.github.io </a:t>
             </a:r>
-            <a:endParaRPr lang="en-AU" sz="3200" dirty="0">
-              <a:solidFill>
-                <a:schemeClr val="bg1"/>
-              </a:solidFill>
-              <a:latin typeface="Arial" panose="020B0604020202020204" pitchFamily="34" charset="0"/>
-              <a:cs typeface="Arial" panose="020B0604020202020204" pitchFamily="34" charset="0"/>
-            </a:endParaRPr>
           </a:p>
         </p:txBody>
       </p:sp>
@@ -4408,13 +4472,6 @@
               </a:rPr>
               <a:t>://rdaymedellin.github.io </a:t>
             </a:r>
-            <a:endParaRPr lang="en-AU" sz="3200" dirty="0">
-              <a:solidFill>
-                <a:schemeClr val="bg1"/>
-              </a:solidFill>
-              <a:latin typeface="Arial" panose="020B0604020202020204" pitchFamily="34" charset="0"/>
-              <a:cs typeface="Arial" panose="020B0604020202020204" pitchFamily="34" charset="0"/>
-            </a:endParaRPr>
           </a:p>
         </p:txBody>
       </p:sp>
@@ -4823,13 +4880,6 @@
               </a:rPr>
               <a:t>://rdaymedellin.github.io </a:t>
             </a:r>
-            <a:endParaRPr lang="en-AU" sz="3200" dirty="0">
-              <a:solidFill>
-                <a:schemeClr val="bg1"/>
-              </a:solidFill>
-              <a:latin typeface="Arial" panose="020B0604020202020204" pitchFamily="34" charset="0"/>
-              <a:cs typeface="Arial" panose="020B0604020202020204" pitchFamily="34" charset="0"/>
-            </a:endParaRPr>
           </a:p>
         </p:txBody>
       </p:sp>
@@ -5267,13 +5317,6 @@
               </a:rPr>
               <a:t>://rdaymedellin.github.io </a:t>
             </a:r>
-            <a:endParaRPr lang="en-AU" sz="3200" dirty="0">
-              <a:solidFill>
-                <a:schemeClr val="bg1"/>
-              </a:solidFill>
-              <a:latin typeface="Arial" panose="020B0604020202020204" pitchFamily="34" charset="0"/>
-              <a:cs typeface="Arial" panose="020B0604020202020204" pitchFamily="34" charset="0"/>
-            </a:endParaRPr>
           </a:p>
         </p:txBody>
       </p:sp>

</xml_diff>